<commit_message>
update on notebook update
</commit_message>
<xml_diff>
--- a/Predict_Customer_Churn_Presentation.pptx
+++ b/Predict_Customer_Churn_Presentation.pptx
@@ -30,6 +30,8 @@
       <p:font typeface="Source Sans Pro" panose="020B0503030403020204" pitchFamily="34" charset="0"/>
       <p:regular r:id="rId17"/>
       <p:bold r:id="rId18"/>
+      <p:italic r:id="rId19"/>
+      <p:boldItalic r:id="rId20"/>
     </p:embeddedFont>
   </p:embeddedFontLst>
   <p:defaultTextStyle>
@@ -228,7 +230,7 @@
           <a:p>
             <a:fld id="{609A43F9-5773-48A6-A5F4-A0C49336E67F}" type="datetimeFigureOut">
               <a:rPr lang="en-US" smtClean="0"/>
-              <a:t>7/20/2025</a:t>
+              <a:t>7/22/2025</a:t>
             </a:fld>
             <a:endParaRPr lang="en-US"/>
           </a:p>
@@ -759,7 +761,7 @@
             <a:fld id="{1D8BD707-D9CF-40AE-B4C6-C98DA3205C09}" type="datetimeFigureOut">
               <a:rPr lang="en-US" smtClean="0"/>
               <a:pPr/>
-              <a:t>7/20/2025</a:t>
+              <a:t>7/22/2025</a:t>
             </a:fld>
             <a:endParaRPr lang="en-US"/>
           </a:p>
@@ -924,7 +926,7 @@
             <a:fld id="{1D8BD707-D9CF-40AE-B4C6-C98DA3205C09}" type="datetimeFigureOut">
               <a:rPr lang="en-US" smtClean="0"/>
               <a:pPr/>
-              <a:t>7/20/2025</a:t>
+              <a:t>7/22/2025</a:t>
             </a:fld>
             <a:endParaRPr lang="en-US"/>
           </a:p>
@@ -1099,7 +1101,7 @@
             <a:fld id="{1D8BD707-D9CF-40AE-B4C6-C98DA3205C09}" type="datetimeFigureOut">
               <a:rPr lang="en-US" smtClean="0"/>
               <a:pPr/>
-              <a:t>7/20/2025</a:t>
+              <a:t>7/22/2025</a:t>
             </a:fld>
             <a:endParaRPr lang="en-US"/>
           </a:p>
@@ -1264,7 +1266,7 @@
             <a:fld id="{1D8BD707-D9CF-40AE-B4C6-C98DA3205C09}" type="datetimeFigureOut">
               <a:rPr lang="en-US" smtClean="0"/>
               <a:pPr/>
-              <a:t>7/20/2025</a:t>
+              <a:t>7/22/2025</a:t>
             </a:fld>
             <a:endParaRPr lang="en-US"/>
           </a:p>
@@ -1506,7 +1508,7 @@
             <a:fld id="{1D8BD707-D9CF-40AE-B4C6-C98DA3205C09}" type="datetimeFigureOut">
               <a:rPr lang="en-US" smtClean="0"/>
               <a:pPr/>
-              <a:t>7/20/2025</a:t>
+              <a:t>7/22/2025</a:t>
             </a:fld>
             <a:endParaRPr lang="en-US"/>
           </a:p>
@@ -1788,7 +1790,7 @@
             <a:fld id="{1D8BD707-D9CF-40AE-B4C6-C98DA3205C09}" type="datetimeFigureOut">
               <a:rPr lang="en-US" smtClean="0"/>
               <a:pPr/>
-              <a:t>7/20/2025</a:t>
+              <a:t>7/22/2025</a:t>
             </a:fld>
             <a:endParaRPr lang="en-US"/>
           </a:p>
@@ -2204,7 +2206,7 @@
             <a:fld id="{1D8BD707-D9CF-40AE-B4C6-C98DA3205C09}" type="datetimeFigureOut">
               <a:rPr lang="en-US" smtClean="0"/>
               <a:pPr/>
-              <a:t>7/20/2025</a:t>
+              <a:t>7/22/2025</a:t>
             </a:fld>
             <a:endParaRPr lang="en-US"/>
           </a:p>
@@ -2318,7 +2320,7 @@
             <a:fld id="{1D8BD707-D9CF-40AE-B4C6-C98DA3205C09}" type="datetimeFigureOut">
               <a:rPr lang="en-US" smtClean="0"/>
               <a:pPr/>
-              <a:t>7/20/2025</a:t>
+              <a:t>7/22/2025</a:t>
             </a:fld>
             <a:endParaRPr lang="en-US"/>
           </a:p>
@@ -2410,7 +2412,7 @@
             <a:fld id="{1D8BD707-D9CF-40AE-B4C6-C98DA3205C09}" type="datetimeFigureOut">
               <a:rPr lang="en-US" smtClean="0"/>
               <a:pPr/>
-              <a:t>7/20/2025</a:t>
+              <a:t>7/22/2025</a:t>
             </a:fld>
             <a:endParaRPr lang="en-US"/>
           </a:p>
@@ -2682,7 +2684,7 @@
             <a:fld id="{1D8BD707-D9CF-40AE-B4C6-C98DA3205C09}" type="datetimeFigureOut">
               <a:rPr lang="en-US" smtClean="0"/>
               <a:pPr/>
-              <a:t>7/20/2025</a:t>
+              <a:t>7/22/2025</a:t>
             </a:fld>
             <a:endParaRPr lang="en-US"/>
           </a:p>
@@ -2931,7 +2933,7 @@
             <a:fld id="{1D8BD707-D9CF-40AE-B4C6-C98DA3205C09}" type="datetimeFigureOut">
               <a:rPr lang="en-US" smtClean="0"/>
               <a:pPr/>
-              <a:t>7/20/2025</a:t>
+              <a:t>7/22/2025</a:t>
             </a:fld>
             <a:endParaRPr lang="en-US"/>
           </a:p>
@@ -3139,7 +3141,7 @@
             <a:fld id="{1D8BD707-D9CF-40AE-B4C6-C98DA3205C09}" type="datetimeFigureOut">
               <a:rPr lang="en-US" smtClean="0"/>
               <a:pPr/>
-              <a:t>7/20/2025</a:t>
+              <a:t>7/22/2025</a:t>
             </a:fld>
             <a:endParaRPr lang="en-US"/>
           </a:p>
@@ -3984,7 +3986,7 @@
                 <a:ea typeface="Source Sans Pro" panose="020B0503030403020204" pitchFamily="34" charset="0"/>
                 <a:cs typeface="Patrick Hand" pitchFamily="34" charset="-120"/>
               </a:rPr>
-              <a:t>Sunday, July 20, 2025</a:t>
+              <a:t>Tuesday, July 22, 2025</a:t>
             </a:fld>
             <a:endParaRPr lang="en-US" sz="3600" dirty="0">
               <a:solidFill>
@@ -4320,7 +4322,7 @@
                 <a:ea typeface="Source Sans Pro" panose="020B0503030403020204" pitchFamily="34" charset="0"/>
                 <a:cs typeface="Source Sans Pro" pitchFamily="34" charset="-120"/>
               </a:rPr>
-              <a:t>94%</a:t>
+              <a:t>93%</a:t>
             </a:r>
             <a:endParaRPr lang="en-US" sz="2400" dirty="0">
               <a:solidFill>
@@ -4523,7 +4525,7 @@
                 <a:ea typeface="Source Sans Pro" panose="020B0503030403020204" pitchFamily="34" charset="0"/>
                 <a:cs typeface="Source Sans Pro" pitchFamily="34" charset="-120"/>
               </a:rPr>
-              <a:t>62%</a:t>
+              <a:t>67%</a:t>
             </a:r>
             <a:endParaRPr lang="en-US" sz="2400" dirty="0">
               <a:solidFill>
@@ -4748,7 +4750,7 @@
                 <a:ea typeface="Source Sans Pro" panose="020B0503030403020204" pitchFamily="34" charset="0"/>
                 <a:cs typeface="Source Sans Pro" pitchFamily="34" charset="-120"/>
               </a:rPr>
-              <a:t>97%</a:t>
+              <a:t>82%</a:t>
             </a:r>
             <a:endParaRPr lang="en-US" sz="2400" dirty="0">
               <a:solidFill>
@@ -4839,7 +4841,7 @@
         </p:nvSpPr>
         <p:spPr>
           <a:xfrm>
-            <a:off x="812959" y="5980152"/>
+            <a:off x="584359" y="6002038"/>
             <a:ext cx="14655641" cy="981551"/>
           </a:xfrm>
           <a:prstGeom prst="rect">
@@ -4962,7 +4964,7 @@
                 <a:ea typeface="Source Sans Pro" panose="020B0503030403020204" pitchFamily="34" charset="0"/>
                 <a:cs typeface="Source Sans Pro" pitchFamily="34" charset="-120"/>
               </a:rPr>
-              <a:t>0.90</a:t>
+              <a:t>0.9037</a:t>
             </a:r>
             <a:endParaRPr lang="en-US" sz="2400" dirty="0">
               <a:solidFill>

</xml_diff>